<commit_message>
AD und Cisco Praesentationen ueberarbeitet
</commit_message>
<xml_diff>
--- a/Wie programmiert man Monte Carlo.pptx
+++ b/Wie programmiert man Monte Carlo.pptx
@@ -269,7 +269,7 @@
           <a:p>
             <a:fld id="{79134EE3-F42C-4B82-A3C4-81BEBB5B2209}" type="datetimeFigureOut">
               <a:rPr lang="de-DE" smtClean="0"/>
-              <a:t>29.08.2023</a:t>
+              <a:t>21.05.2024</a:t>
             </a:fld>
             <a:endParaRPr lang="de-DE"/>
           </a:p>
@@ -467,7 +467,7 @@
           <a:p>
             <a:fld id="{79134EE3-F42C-4B82-A3C4-81BEBB5B2209}" type="datetimeFigureOut">
               <a:rPr lang="de-DE" smtClean="0"/>
-              <a:t>29.08.2023</a:t>
+              <a:t>21.05.2024</a:t>
             </a:fld>
             <a:endParaRPr lang="de-DE"/>
           </a:p>
@@ -675,7 +675,7 @@
           <a:p>
             <a:fld id="{79134EE3-F42C-4B82-A3C4-81BEBB5B2209}" type="datetimeFigureOut">
               <a:rPr lang="de-DE" smtClean="0"/>
-              <a:t>29.08.2023</a:t>
+              <a:t>21.05.2024</a:t>
             </a:fld>
             <a:endParaRPr lang="de-DE"/>
           </a:p>
@@ -891,7 +891,7 @@
           <a:p>
             <a:fld id="{79134EE3-F42C-4B82-A3C4-81BEBB5B2209}" type="datetimeFigureOut">
               <a:rPr lang="de-DE" smtClean="0"/>
-              <a:t>29.08.2023</a:t>
+              <a:t>21.05.2024</a:t>
             </a:fld>
             <a:endParaRPr lang="de-DE"/>
           </a:p>
@@ -1195,7 +1195,7 @@
           <a:p>
             <a:fld id="{79134EE3-F42C-4B82-A3C4-81BEBB5B2209}" type="datetimeFigureOut">
               <a:rPr lang="de-DE" smtClean="0"/>
-              <a:t>29.08.2023</a:t>
+              <a:t>21.05.2024</a:t>
             </a:fld>
             <a:endParaRPr lang="de-DE"/>
           </a:p>
@@ -1460,7 +1460,7 @@
           <a:p>
             <a:fld id="{79134EE3-F42C-4B82-A3C4-81BEBB5B2209}" type="datetimeFigureOut">
               <a:rPr lang="de-DE" smtClean="0"/>
-              <a:t>29.08.2023</a:t>
+              <a:t>21.05.2024</a:t>
             </a:fld>
             <a:endParaRPr lang="de-DE"/>
           </a:p>
@@ -1872,7 +1872,7 @@
           <a:p>
             <a:fld id="{79134EE3-F42C-4B82-A3C4-81BEBB5B2209}" type="datetimeFigureOut">
               <a:rPr lang="de-DE" smtClean="0"/>
-              <a:t>29.08.2023</a:t>
+              <a:t>21.05.2024</a:t>
             </a:fld>
             <a:endParaRPr lang="de-DE"/>
           </a:p>
@@ -2013,7 +2013,7 @@
           <a:p>
             <a:fld id="{79134EE3-F42C-4B82-A3C4-81BEBB5B2209}" type="datetimeFigureOut">
               <a:rPr lang="de-DE" smtClean="0"/>
-              <a:t>29.08.2023</a:t>
+              <a:t>21.05.2024</a:t>
             </a:fld>
             <a:endParaRPr lang="de-DE"/>
           </a:p>
@@ -2126,7 +2126,7 @@
           <a:p>
             <a:fld id="{79134EE3-F42C-4B82-A3C4-81BEBB5B2209}" type="datetimeFigureOut">
               <a:rPr lang="de-DE" smtClean="0"/>
-              <a:t>29.08.2023</a:t>
+              <a:t>21.05.2024</a:t>
             </a:fld>
             <a:endParaRPr lang="de-DE"/>
           </a:p>
@@ -2437,7 +2437,7 @@
           <a:p>
             <a:fld id="{79134EE3-F42C-4B82-A3C4-81BEBB5B2209}" type="datetimeFigureOut">
               <a:rPr lang="de-DE" smtClean="0"/>
-              <a:t>29.08.2023</a:t>
+              <a:t>21.05.2024</a:t>
             </a:fld>
             <a:endParaRPr lang="de-DE"/>
           </a:p>
@@ -2725,7 +2725,7 @@
           <a:p>
             <a:fld id="{79134EE3-F42C-4B82-A3C4-81BEBB5B2209}" type="datetimeFigureOut">
               <a:rPr lang="de-DE" smtClean="0"/>
-              <a:t>29.08.2023</a:t>
+              <a:t>21.05.2024</a:t>
             </a:fld>
             <a:endParaRPr lang="de-DE"/>
           </a:p>
@@ -2966,7 +2966,7 @@
           <a:p>
             <a:fld id="{79134EE3-F42C-4B82-A3C4-81BEBB5B2209}" type="datetimeFigureOut">
               <a:rPr lang="de-DE" smtClean="0"/>
-              <a:t>29.08.2023</a:t>
+              <a:t>21.05.2024</a:t>
             </a:fld>
             <a:endParaRPr lang="de-DE"/>
           </a:p>
@@ -4397,8 +4397,8 @@
         </p:nvSpPr>
         <p:spPr>
           <a:xfrm>
-            <a:off x="525295" y="1825624"/>
-            <a:ext cx="11549973" cy="4737303"/>
+            <a:off x="525295" y="1684203"/>
+            <a:ext cx="11549973" cy="5173797"/>
           </a:xfrm>
         </p:spPr>
         <p:txBody>
@@ -4466,7 +4466,7 @@
               <a:rPr lang="de-DE" dirty="0">
                 <a:sym typeface="Wingdings" panose="05000000000000000000" pitchFamily="2" charset="2"/>
               </a:rPr>
-              <a:t> Setzt den Zufallszahlengenerator auf einen festen Startwert (Seed) 1 und liefert dann immer die gleiche Folge an Zufallszahlen</a:t>
+              <a:t> Setzt den Zufallszahlengenerator auf einen festen Startwert (engl. Seed) 1 und liefert dann immer die gleiche Folge an Zufallszahlen</a:t>
             </a:r>
           </a:p>
           <a:p>
@@ -5012,7 +5012,7 @@
           <a:p>
             <a:r>
               <a:rPr lang="de-DE" dirty="0"/>
-              <a:t>Damit die Samples aussagekräftig werden, lässt man diese in einer Schleife 100.000 Mal durchlaufen.</a:t>
+              <a:t>Damit die Samples aussagekräftig werden, lässt man diese in einer Schleife 100_000 Mal durchlaufen.</a:t>
             </a:r>
           </a:p>
           <a:p>
@@ -5336,7 +5336,19 @@
           <a:p>
             <a:r>
               <a:rPr lang="de-DE" dirty="0"/>
-              <a:t>Wenn man die Anzahl der Samples von 50 auf 500 und dann auf 5.000, 500.000, 5.000.000 erhöht, nähert sich das Ergebnis immer mehr einem Wert an (Erwartungswert). </a:t>
+              <a:t>Wenn man die Anzahl der Samples von 50 auf 500 und dann auf 5.000, 500.000, 5.000.000 erhöht, nähert sich das Ergebnis immer mehr einem Wert an (</a:t>
+            </a:r>
+            <a:r>
+              <a:rPr lang="de-DE" dirty="0" err="1"/>
+              <a:t>mathem</a:t>
+            </a:r>
+            <a:r>
+              <a:rPr lang="de-DE"/>
+              <a:t>. Erwartungswert</a:t>
+            </a:r>
+            <a:r>
+              <a:rPr lang="de-DE" dirty="0"/>
+              <a:t>). </a:t>
             </a:r>
             <a:br>
               <a:rPr lang="de-DE" dirty="0"/>

</xml_diff>